<commit_message>
Powerpoint mit Screenshot Jiira
Folie 4 zeigt wie im Sprint die Issues abgebaut werden
</commit_message>
<xml_diff>
--- a/Huuskaffi_Jira.pptx
+++ b/Huuskaffi_Jira.pptx
@@ -8,6 +8,7 @@
     <p:sldId id="256" r:id="rId2"/>
     <p:sldId id="257" r:id="rId3"/>
     <p:sldId id="258" r:id="rId4"/>
+    <p:sldId id="259" r:id="rId5"/>
   </p:sldIdLst>
   <p:sldSz cx="12192000" cy="6858000"/>
   <p:notesSz cx="6858000" cy="9144000"/>
@@ -3360,6 +3361,93 @@
 </p:sld>
 </file>
 
+<file path=ppt/slides/slide4.xml><?xml version="1.0" encoding="utf-8"?>
+<p:sld xmlns:a="http://schemas.openxmlformats.org/drawingml/2006/main" xmlns:r="http://schemas.openxmlformats.org/officeDocument/2006/relationships" xmlns:p="http://schemas.openxmlformats.org/presentationml/2006/main">
+  <p:cSld>
+    <p:spTree>
+      <p:nvGrpSpPr>
+        <p:cNvPr id="1" name=""/>
+        <p:cNvGrpSpPr/>
+        <p:nvPr/>
+      </p:nvGrpSpPr>
+      <p:grpSpPr>
+        <a:xfrm>
+          <a:off x="0" y="0"/>
+          <a:ext cx="0" cy="0"/>
+          <a:chOff x="0" y="0"/>
+          <a:chExt cx="0" cy="0"/>
+        </a:xfrm>
+      </p:grpSpPr>
+      <p:sp>
+        <p:nvSpPr>
+          <p:cNvPr id="2" name="Titel 1">
+            <a:extLst>
+              <a:ext uri="{FF2B5EF4-FFF2-40B4-BE49-F238E27FC236}">
+                <a16:creationId xmlns:a16="http://schemas.microsoft.com/office/drawing/2014/main" id="{2C720389-3164-3343-8B78-FFB14B11D2CF}"/>
+              </a:ext>
+            </a:extLst>
+          </p:cNvPr>
+          <p:cNvSpPr>
+            <a:spLocks noGrp="1"/>
+          </p:cNvSpPr>
+          <p:nvPr>
+            <p:ph type="title"/>
+          </p:nvPr>
+        </p:nvSpPr>
+        <p:spPr/>
+        <p:txBody>
+          <a:bodyPr/>
+          <a:lstStyle/>
+          <a:p>
+            <a:r>
+              <a:rPr lang="de-DE" dirty="0"/>
+              <a:t>Sprint abbauen</a:t>
+            </a:r>
+          </a:p>
+        </p:txBody>
+      </p:sp>
+      <p:pic>
+        <p:nvPicPr>
+          <p:cNvPr id="5" name="Inhaltsplatzhalter 4">
+            <a:extLst>
+              <a:ext uri="{FF2B5EF4-FFF2-40B4-BE49-F238E27FC236}">
+                <a16:creationId xmlns:a16="http://schemas.microsoft.com/office/drawing/2014/main" id="{69E40D22-2187-7148-8676-29CBD489006D}"/>
+              </a:ext>
+            </a:extLst>
+          </p:cNvPr>
+          <p:cNvPicPr>
+            <a:picLocks noGrp="1" noChangeAspect="1"/>
+          </p:cNvPicPr>
+          <p:nvPr>
+            <p:ph idx="1"/>
+          </p:nvPr>
+        </p:nvPicPr>
+        <p:blipFill>
+          <a:blip r:embed="rId2"/>
+          <a:stretch>
+            <a:fillRect/>
+          </a:stretch>
+        </p:blipFill>
+        <p:spPr>
+          <a:xfrm>
+            <a:off x="4049033" y="1825625"/>
+            <a:ext cx="4093934" cy="4351338"/>
+          </a:xfrm>
+        </p:spPr>
+      </p:pic>
+    </p:spTree>
+    <p:extLst>
+      <p:ext uri="{BB962C8B-B14F-4D97-AF65-F5344CB8AC3E}">
+        <p14:creationId xmlns:p14="http://schemas.microsoft.com/office/powerpoint/2010/main" val="91555012"/>
+      </p:ext>
+    </p:extLst>
+  </p:cSld>
+  <p:clrMapOvr>
+    <a:masterClrMapping/>
+  </p:clrMapOvr>
+</p:sld>
+</file>
+
 <file path=ppt/theme/theme1.xml><?xml version="1.0" encoding="utf-8"?>
 <a:theme xmlns:a="http://schemas.openxmlformats.org/drawingml/2006/main" name="Office">
   <a:themeElements>

</xml_diff>